<commit_message>
Making two distribution options for R:     - package     - stand alone
Packaging R involves:
    - changes in build script
    - documentation of functions
    - moving files around

Added coefficients to reaction model method

Minor fixes:
    - scalar from @_ with  <AMTIFY>
    - changes to example systems
    - R workflow: handling bounds during estimation
</commit_message>
<xml_diff>
--- a/ubiquity_template/library/templates/report.pptx
+++ b/ubiquity_template/library/templates/report.pptx
@@ -13,7 +13,7 @@
   <p:sldSz cx="9144000" cy="6858000" type="screen4x3"/>
   <p:notesSz cx="6858000" cy="9144000"/>
   <p:custDataLst>
-    <p:tags r:id="rId5"/>
+    <p:tags r:id="rId4"/>
   </p:custDataLst>
   <p:defaultTextStyle>
     <a:defPPr>
@@ -110,6 +110,22 @@
       </a:defRPr>
     </a:lvl9pPr>
   </p:defaultTextStyle>
+  <p:extLst>
+    <p:ext uri="{EFAFB233-063F-42B5-8137-9DF3F51BA10A}">
+      <p15:sldGuideLst xmlns:p15="http://schemas.microsoft.com/office/powerpoint/2012/main">
+        <p15:guide id="1" orient="horz" pos="2160">
+          <p15:clr>
+            <a:srgbClr val="A4A3A4"/>
+          </p15:clr>
+        </p15:guide>
+        <p15:guide id="2" pos="2880">
+          <p15:clr>
+            <a:srgbClr val="A4A3A4"/>
+          </p15:clr>
+        </p15:guide>
+      </p15:sldGuideLst>
+    </p:ext>
+  </p:extLst>
 </p:presentation>
 </file>
 
@@ -195,7 +211,7 @@
           <a:p>
             <a:fld id="{1B656253-81D4-504C-9F22-C43A5586B7F8}" type="datetimeFigureOut">
               <a:rPr lang="en-US" smtClean="0"/>
-              <a:t>1/28/18</a:t>
+              <a:t>4/18/18</a:t>
             </a:fld>
             <a:endParaRPr lang="en-US"/>
           </a:p>
@@ -361,7 +377,7 @@
           <a:p>
             <a:fld id="{EEA38B4D-A065-A048-981C-DE16882AB0B1}" type="datetimeFigureOut">
               <a:rPr lang="en-US" smtClean="0"/>
-              <a:t>1/28/18</a:t>
+              <a:t>4/18/18</a:t>
             </a:fld>
             <a:endParaRPr lang="en-US"/>
           </a:p>
@@ -632,7 +648,7 @@
 
 <file path=ppt/slideLayouts/slideLayout1.xml><?xml version="1.0" encoding="utf-8"?>
 <p:sldLayout xmlns:a="http://schemas.openxmlformats.org/drawingml/2006/main" xmlns:r="http://schemas.openxmlformats.org/officeDocument/2006/relationships" xmlns:p="http://schemas.openxmlformats.org/presentationml/2006/main" type="title" preserve="1">
-  <p:cSld name="Title Slide">
+  <p:cSld name="title_slide">
     <p:spTree>
       <p:nvGrpSpPr>
         <p:cNvPr id="1" name=""/>
@@ -839,7 +855,7 @@
 
 <file path=ppt/slideLayouts/slideLayout10.xml><?xml version="1.0" encoding="utf-8"?>
 <p:sldLayout xmlns:a="http://schemas.openxmlformats.org/drawingml/2006/main" xmlns:r="http://schemas.openxmlformats.org/officeDocument/2006/relationships" xmlns:p="http://schemas.openxmlformats.org/presentationml/2006/main" preserve="1" userDrawn="1">
-  <p:cSld name="Blank">
+  <p:cSld name="blank">
     <p:spTree>
       <p:nvGrpSpPr>
         <p:cNvPr id="1" name=""/>
@@ -871,7 +887,7 @@
           <a:p>
             <a:fld id="{52BA1850-337E-7747-91FB-64B4051995E4}" type="datetime1">
               <a:rPr lang="en-US" smtClean="0"/>
-              <a:t>1/28/18</a:t>
+              <a:t>4/18/18</a:t>
             </a:fld>
             <a:endParaRPr lang="en-GB"/>
           </a:p>
@@ -934,7 +950,7 @@
 
 <file path=ppt/slideLayouts/slideLayout2.xml><?xml version="1.0" encoding="utf-8"?>
 <p:sldLayout xmlns:a="http://schemas.openxmlformats.org/drawingml/2006/main" xmlns:r="http://schemas.openxmlformats.org/officeDocument/2006/relationships" xmlns:p="http://schemas.openxmlformats.org/presentationml/2006/main" preserve="1" userDrawn="1">
-  <p:cSld name="Title and Content List">
+  <p:cSld name="content_list">
     <p:spTree>
       <p:nvGrpSpPr>
         <p:cNvPr id="1" name=""/>
@@ -1024,7 +1040,12 @@
             <p:ph idx="1"/>
           </p:nvPr>
         </p:nvSpPr>
-        <p:spPr/>
+        <p:spPr>
+          <a:xfrm>
+            <a:off x="251520" y="1600200"/>
+            <a:ext cx="8686800" cy="4572000"/>
+          </a:xfrm>
+        </p:spPr>
         <p:txBody>
           <a:bodyPr/>
           <a:lstStyle/>
@@ -1083,7 +1104,7 @@
           <a:p>
             <a:fld id="{BB662456-9DF9-7F42-9863-03F75BEC0447}" type="datetime1">
               <a:rPr lang="en-US" smtClean="0"/>
-              <a:t>1/28/18</a:t>
+              <a:t>4/18/18</a:t>
             </a:fld>
             <a:endParaRPr lang="en-GB"/>
           </a:p>
@@ -1255,7 +1276,7 @@
 
 <file path=ppt/slideLayouts/slideLayout3.xml><?xml version="1.0" encoding="utf-8"?>
 <p:sldLayout xmlns:a="http://schemas.openxmlformats.org/drawingml/2006/main" xmlns:r="http://schemas.openxmlformats.org/officeDocument/2006/relationships" xmlns:p="http://schemas.openxmlformats.org/presentationml/2006/main" preserve="1" userDrawn="1">
-  <p:cSld name="Title and Content Text">
+  <p:cSld name="content_text">
     <p:spTree>
       <p:nvGrpSpPr>
         <p:cNvPr id="1" name=""/>
@@ -1348,7 +1369,7 @@
         <p:spPr>
           <a:xfrm>
             <a:off x="251520" y="1600200"/>
-            <a:ext cx="8640960" cy="4637112"/>
+            <a:ext cx="8686800" cy="4572000"/>
           </a:xfrm>
         </p:spPr>
         <p:txBody>
@@ -1430,7 +1451,7 @@
           <a:p>
             <a:fld id="{AA0DAA0C-97E8-DA4A-9975-EC4E464C2F40}" type="datetime1">
               <a:rPr lang="en-US" smtClean="0"/>
-              <a:t>1/28/18</a:t>
+              <a:t>4/18/18</a:t>
             </a:fld>
             <a:endParaRPr lang="en-GB"/>
           </a:p>
@@ -1602,7 +1623,7 @@
 
 <file path=ppt/slideLayouts/slideLayout4.xml><?xml version="1.0" encoding="utf-8"?>
 <p:sldLayout xmlns:a="http://schemas.openxmlformats.org/drawingml/2006/main" xmlns:r="http://schemas.openxmlformats.org/officeDocument/2006/relationships" xmlns:p="http://schemas.openxmlformats.org/presentationml/2006/main" type="secHead" preserve="1">
-  <p:cSld name="Section Header">
+  <p:cSld name="section_slide">
     <p:spTree>
       <p:nvGrpSpPr>
         <p:cNvPr id="1" name=""/>
@@ -1835,7 +1856,7 @@
 
 <file path=ppt/slideLayouts/slideLayout5.xml><?xml version="1.0" encoding="utf-8"?>
 <p:sldLayout xmlns:a="http://schemas.openxmlformats.org/drawingml/2006/main" xmlns:r="http://schemas.openxmlformats.org/officeDocument/2006/relationships" xmlns:p="http://schemas.openxmlformats.org/presentationml/2006/main" preserve="1" userDrawn="1">
-  <p:cSld name="Two Content Header List">
+  <p:cSld name="two_content_header_list">
     <p:spTree>
       <p:nvGrpSpPr>
         <p:cNvPr id="1" name=""/>
@@ -2131,7 +2152,7 @@
           <a:p>
             <a:fld id="{04A76F9C-33B6-4248-95F4-E755A51BE64F}" type="datetime1">
               <a:rPr lang="en-US" smtClean="0"/>
-              <a:t>1/28/18</a:t>
+              <a:t>4/18/18</a:t>
             </a:fld>
             <a:endParaRPr lang="en-GB"/>
           </a:p>
@@ -2404,7 +2425,7 @@
 
 <file path=ppt/slideLayouts/slideLayout6.xml><?xml version="1.0" encoding="utf-8"?>
 <p:sldLayout xmlns:a="http://schemas.openxmlformats.org/drawingml/2006/main" xmlns:r="http://schemas.openxmlformats.org/officeDocument/2006/relationships" xmlns:p="http://schemas.openxmlformats.org/presentationml/2006/main" preserve="1" userDrawn="1">
-  <p:cSld name="Two Content Header Text">
+  <p:cSld name="two_content_header_text">
     <p:spTree>
       <p:nvGrpSpPr>
         <p:cNvPr id="1" name=""/>
@@ -2710,7 +2731,7 @@
           <a:p>
             <a:fld id="{7BA53915-059E-FD4B-A198-BD5AD9F97206}" type="datetime1">
               <a:rPr lang="en-US" smtClean="0"/>
-              <a:t>1/28/18</a:t>
+              <a:t>4/18/18</a:t>
             </a:fld>
             <a:endParaRPr lang="en-GB"/>
           </a:p>
@@ -2983,7 +3004,7 @@
 
 <file path=ppt/slideLayouts/slideLayout7.xml><?xml version="1.0" encoding="utf-8"?>
 <p:sldLayout xmlns:a="http://schemas.openxmlformats.org/drawingml/2006/main" xmlns:r="http://schemas.openxmlformats.org/officeDocument/2006/relationships" xmlns:p="http://schemas.openxmlformats.org/presentationml/2006/main" preserve="1" userDrawn="1">
-  <p:cSld name="Two Content List">
+  <p:cSld name="two_content_list">
     <p:spTree>
       <p:nvGrpSpPr>
         <p:cNvPr id="1" name=""/>
@@ -3105,7 +3126,7 @@
         <p:spPr>
           <a:xfrm>
             <a:off x="251520" y="1600200"/>
-            <a:ext cx="4244280" cy="4637112"/>
+            <a:ext cx="4261104" cy="4572000"/>
           </a:xfrm>
         </p:spPr>
         <p:txBody>
@@ -3190,7 +3211,7 @@
         <p:spPr>
           <a:xfrm>
             <a:off x="4648200" y="1600200"/>
-            <a:ext cx="4244280" cy="4637112"/>
+            <a:ext cx="4251960" cy="4572000"/>
           </a:xfrm>
         </p:spPr>
         <p:txBody>
@@ -3279,7 +3300,7 @@
           <a:p>
             <a:fld id="{F7C6CE28-510F-5240-BB2D-5CAA84033ED0}" type="datetime1">
               <a:rPr lang="en-US" smtClean="0"/>
-              <a:t>1/28/18</a:t>
+              <a:t>4/18/18</a:t>
             </a:fld>
             <a:endParaRPr lang="en-GB"/>
           </a:p>
@@ -3422,7 +3443,7 @@
 
 <file path=ppt/slideLayouts/slideLayout8.xml><?xml version="1.0" encoding="utf-8"?>
 <p:sldLayout xmlns:a="http://schemas.openxmlformats.org/drawingml/2006/main" xmlns:r="http://schemas.openxmlformats.org/officeDocument/2006/relationships" xmlns:p="http://schemas.openxmlformats.org/presentationml/2006/main" preserve="1" userDrawn="1">
-  <p:cSld name="Two Content Text">
+  <p:cSld name="two_content_text">
     <p:spTree>
       <p:nvGrpSpPr>
         <p:cNvPr id="1" name=""/>
@@ -3728,7 +3749,7 @@
           <a:p>
             <a:fld id="{DC8473B6-9DB1-6841-865B-A1275004FC4D}" type="datetime1">
               <a:rPr lang="en-US" smtClean="0"/>
-              <a:t>1/28/18</a:t>
+              <a:t>4/18/18</a:t>
             </a:fld>
             <a:endParaRPr lang="en-GB"/>
           </a:p>
@@ -3871,7 +3892,7 @@
 
 <file path=ppt/slideLayouts/slideLayout9.xml><?xml version="1.0" encoding="utf-8"?>
 <p:sldLayout xmlns:a="http://schemas.openxmlformats.org/drawingml/2006/main" xmlns:r="http://schemas.openxmlformats.org/officeDocument/2006/relationships" xmlns:p="http://schemas.openxmlformats.org/presentationml/2006/main" preserve="1" userDrawn="1">
-  <p:cSld name="Title Only">
+  <p:cSld name="title_only">
     <p:spTree>
       <p:nvGrpSpPr>
         <p:cNvPr id="1" name=""/>
@@ -3963,7 +3984,7 @@
           <a:p>
             <a:fld id="{D871C1FE-9025-5C49-BA5C-C24D6151D8FF}" type="datetime1">
               <a:rPr lang="en-US" smtClean="0"/>
-              <a:t>1/28/18</a:t>
+              <a:t>4/18/18</a:t>
             </a:fld>
             <a:endParaRPr lang="en-GB"/>
           </a:p>
@@ -4205,7 +4226,7 @@
           <a:p>
             <a:fld id="{13B1BC43-4B43-954F-8BAE-86993A84B7B7}" type="datetime1">
               <a:rPr lang="en-US" smtClean="0"/>
-              <a:t>1/28/18</a:t>
+              <a:t>4/18/18</a:t>
             </a:fld>
             <a:endParaRPr lang="en-GB"/>
           </a:p>

</xml_diff>

<commit_message>
Added NCA options: R Workflow
Misc documentation fixes

Reporting:
    - Updated logos and fixed the template

Simulation:
    - Added error handling for catching input errors to run_simulation_ubiqity
    - Modified the automated sampling to include bolus times

Estimation:
    - Added debugging information when solution statistics failed to calculate
    - Fixed ML estimation going off to negative infinity

NCA:
    - C0 extrapolation
    - Analysis of sparse sampled data
    - Workshop components
</commit_message>
<xml_diff>
--- a/ubiquity_template/library/templates/report.pptx
+++ b/ubiquity_template/library/templates/report.pptx
@@ -211,7 +211,7 @@
           <a:p>
             <a:fld id="{1B656253-81D4-504C-9F22-C43A5586B7F8}" type="datetimeFigureOut">
               <a:rPr lang="en-US" smtClean="0"/>
-              <a:t>5/5/19</a:t>
+              <a:t>7/1/19</a:t>
             </a:fld>
             <a:endParaRPr lang="en-US"/>
           </a:p>
@@ -377,7 +377,7 @@
           <a:p>
             <a:fld id="{EEA38B4D-A065-A048-981C-DE16882AB0B1}" type="datetimeFigureOut">
               <a:rPr lang="en-US" smtClean="0"/>
-              <a:t>5/5/19</a:t>
+              <a:t>7/1/19</a:t>
             </a:fld>
             <a:endParaRPr lang="en-US"/>
           </a:p>
@@ -931,7 +931,7 @@
           <a:p>
             <a:fld id="{52BA1850-337E-7747-91FB-64B4051995E4}" type="datetime1">
               <a:rPr lang="en-US" smtClean="0"/>
-              <a:t>5/5/19</a:t>
+              <a:t>7/1/19</a:t>
             </a:fld>
             <a:endParaRPr lang="en-GB"/>
           </a:p>
@@ -1167,7 +1167,7 @@
           <a:p>
             <a:fld id="{BB662456-9DF9-7F42-9863-03F75BEC0447}" type="datetime1">
               <a:rPr lang="en-US" smtClean="0"/>
-              <a:t>5/5/19</a:t>
+              <a:t>7/1/19</a:t>
             </a:fld>
             <a:endParaRPr lang="en-GB"/>
           </a:p>
@@ -1503,7 +1503,7 @@
           <a:p>
             <a:fld id="{AA0DAA0C-97E8-DA4A-9975-EC4E464C2F40}" type="datetime1">
               <a:rPr lang="en-US" smtClean="0"/>
-              <a:t>5/5/19</a:t>
+              <a:t>7/1/19</a:t>
             </a:fld>
             <a:endParaRPr lang="en-GB"/>
           </a:p>
@@ -2184,7 +2184,7 @@
           <a:p>
             <a:fld id="{04A76F9C-33B6-4248-95F4-E755A51BE64F}" type="datetime1">
               <a:rPr lang="en-US" smtClean="0"/>
-              <a:t>5/5/19</a:t>
+              <a:t>7/1/19</a:t>
             </a:fld>
             <a:endParaRPr lang="en-GB"/>
           </a:p>
@@ -2567,27 +2567,29 @@
           </a:xfrm>
         </p:spPr>
         <p:txBody>
-          <a:bodyPr/>
+          <a:bodyPr>
+            <a:normAutofit/>
+          </a:bodyPr>
           <a:lstStyle>
             <a:lvl1pPr marL="0" indent="0">
               <a:buNone/>
-              <a:defRPr sz="2800"/>
+              <a:defRPr sz="2400"/>
             </a:lvl1pPr>
             <a:lvl2pPr marL="457200" indent="0">
               <a:buNone/>
-              <a:defRPr sz="2400"/>
+              <a:defRPr sz="2000"/>
             </a:lvl2pPr>
             <a:lvl3pPr marL="914400" indent="0">
               <a:buNone/>
-              <a:defRPr sz="2000"/>
+              <a:defRPr sz="1800"/>
             </a:lvl3pPr>
             <a:lvl4pPr marL="1371600" indent="0">
               <a:buNone/>
-              <a:defRPr sz="1800"/>
+              <a:defRPr sz="1600"/>
             </a:lvl4pPr>
             <a:lvl5pPr marL="1828800" indent="0">
               <a:buNone/>
-              <a:defRPr sz="1800"/>
+              <a:defRPr sz="1600"/>
             </a:lvl5pPr>
             <a:lvl6pPr>
               <a:defRPr sz="1800"/>
@@ -2657,27 +2659,29 @@
           </a:xfrm>
         </p:spPr>
         <p:txBody>
-          <a:bodyPr/>
+          <a:bodyPr>
+            <a:normAutofit/>
+          </a:bodyPr>
           <a:lstStyle>
             <a:lvl1pPr marL="0" indent="0">
               <a:buNone/>
-              <a:defRPr sz="2800"/>
+              <a:defRPr sz="2400"/>
             </a:lvl1pPr>
             <a:lvl2pPr marL="457200" indent="0">
               <a:buNone/>
-              <a:defRPr sz="2400"/>
+              <a:defRPr sz="2000"/>
             </a:lvl2pPr>
             <a:lvl3pPr marL="914400" indent="0">
               <a:buNone/>
-              <a:defRPr sz="2000"/>
+              <a:defRPr sz="1800"/>
             </a:lvl3pPr>
             <a:lvl4pPr marL="1371600" indent="0">
               <a:buNone/>
-              <a:defRPr sz="1800"/>
+              <a:defRPr sz="1600"/>
             </a:lvl4pPr>
             <a:lvl5pPr marL="1828800" indent="0">
               <a:buNone/>
-              <a:defRPr sz="1800"/>
+              <a:defRPr sz="1600"/>
             </a:lvl5pPr>
             <a:lvl6pPr>
               <a:defRPr sz="1800"/>
@@ -2752,7 +2756,7 @@
           <a:p>
             <a:fld id="{7BA53915-059E-FD4B-A198-BD5AD9F97206}" type="datetime1">
               <a:rPr lang="en-US" smtClean="0"/>
-              <a:t>5/5/19</a:t>
+              <a:t>7/1/19</a:t>
             </a:fld>
             <a:endParaRPr lang="en-GB"/>
           </a:p>
@@ -3135,22 +3139,24 @@
           </a:xfrm>
         </p:spPr>
         <p:txBody>
-          <a:bodyPr/>
+          <a:bodyPr>
+            <a:normAutofit/>
+          </a:bodyPr>
           <a:lstStyle>
             <a:lvl1pPr>
-              <a:defRPr sz="2800"/>
+              <a:defRPr sz="2400"/>
             </a:lvl1pPr>
             <a:lvl2pPr>
-              <a:defRPr sz="2400"/>
+              <a:defRPr sz="2000"/>
             </a:lvl2pPr>
             <a:lvl3pPr>
-              <a:defRPr sz="2000"/>
+              <a:defRPr sz="1800"/>
             </a:lvl3pPr>
             <a:lvl4pPr>
-              <a:defRPr sz="1800"/>
+              <a:defRPr sz="1600"/>
             </a:lvl4pPr>
             <a:lvl5pPr>
-              <a:defRPr sz="1800"/>
+              <a:defRPr sz="1600"/>
             </a:lvl5pPr>
             <a:lvl6pPr>
               <a:defRPr sz="1800"/>
@@ -3220,22 +3226,24 @@
           </a:xfrm>
         </p:spPr>
         <p:txBody>
-          <a:bodyPr/>
+          <a:bodyPr>
+            <a:normAutofit/>
+          </a:bodyPr>
           <a:lstStyle>
             <a:lvl1pPr>
-              <a:defRPr sz="2800"/>
+              <a:defRPr sz="2400"/>
             </a:lvl1pPr>
             <a:lvl2pPr>
-              <a:defRPr sz="2400"/>
+              <a:defRPr sz="2000"/>
             </a:lvl2pPr>
             <a:lvl3pPr>
-              <a:defRPr sz="2000"/>
+              <a:defRPr sz="1800"/>
             </a:lvl3pPr>
             <a:lvl4pPr>
-              <a:defRPr sz="1800"/>
+              <a:defRPr sz="1600"/>
             </a:lvl4pPr>
             <a:lvl5pPr>
-              <a:defRPr sz="1800"/>
+              <a:defRPr sz="1600"/>
             </a:lvl5pPr>
             <a:lvl6pPr>
               <a:defRPr sz="1800"/>
@@ -3310,7 +3318,7 @@
           <a:p>
             <a:fld id="{F7C6CE28-510F-5240-BB2D-5CAA84033ED0}" type="datetime1">
               <a:rPr lang="en-US" smtClean="0"/>
-              <a:t>5/5/19</a:t>
+              <a:t>7/1/19</a:t>
             </a:fld>
             <a:endParaRPr lang="en-GB"/>
           </a:p>
@@ -3563,27 +3571,29 @@
           </a:xfrm>
         </p:spPr>
         <p:txBody>
-          <a:bodyPr/>
+          <a:bodyPr>
+            <a:normAutofit/>
+          </a:bodyPr>
           <a:lstStyle>
             <a:lvl1pPr marL="0" indent="0">
               <a:buNone/>
-              <a:defRPr sz="2800"/>
+              <a:defRPr sz="2400"/>
             </a:lvl1pPr>
             <a:lvl2pPr marL="457200" indent="0">
               <a:buNone/>
-              <a:defRPr sz="2400"/>
+              <a:defRPr sz="2000"/>
             </a:lvl2pPr>
             <a:lvl3pPr marL="914400" indent="0">
               <a:buNone/>
-              <a:defRPr sz="2000"/>
+              <a:defRPr sz="1800"/>
             </a:lvl3pPr>
             <a:lvl4pPr marL="1371600" indent="0">
               <a:buNone/>
-              <a:defRPr sz="1800"/>
+              <a:defRPr sz="1600"/>
             </a:lvl4pPr>
             <a:lvl5pPr marL="1828800" indent="0">
               <a:buNone/>
-              <a:defRPr sz="1800"/>
+              <a:defRPr sz="1600"/>
             </a:lvl5pPr>
             <a:lvl6pPr>
               <a:defRPr sz="1800"/>
@@ -3653,27 +3663,29 @@
           </a:xfrm>
         </p:spPr>
         <p:txBody>
-          <a:bodyPr/>
+          <a:bodyPr>
+            <a:normAutofit/>
+          </a:bodyPr>
           <a:lstStyle>
             <a:lvl1pPr marL="0" indent="0">
               <a:buNone/>
-              <a:defRPr sz="2800"/>
+              <a:defRPr sz="2400"/>
             </a:lvl1pPr>
             <a:lvl2pPr marL="457200" indent="0">
               <a:buNone/>
-              <a:defRPr sz="2400"/>
+              <a:defRPr sz="2000"/>
             </a:lvl2pPr>
             <a:lvl3pPr marL="914400" indent="0">
               <a:buNone/>
-              <a:defRPr sz="2000"/>
+              <a:defRPr sz="1800"/>
             </a:lvl3pPr>
             <a:lvl4pPr marL="1371600" indent="0">
               <a:buNone/>
-              <a:defRPr sz="1800"/>
+              <a:defRPr sz="1600"/>
             </a:lvl4pPr>
             <a:lvl5pPr marL="1828800" indent="0">
               <a:buNone/>
-              <a:defRPr sz="1800"/>
+              <a:defRPr sz="1600"/>
             </a:lvl5pPr>
             <a:lvl6pPr>
               <a:defRPr sz="1800"/>
@@ -3748,7 +3760,7 @@
           <a:p>
             <a:fld id="{DC8473B6-9DB1-6841-865B-A1275004FC4D}" type="datetime1">
               <a:rPr lang="en-US" smtClean="0"/>
-              <a:t>5/5/19</a:t>
+              <a:t>7/1/19</a:t>
             </a:fld>
             <a:endParaRPr lang="en-GB"/>
           </a:p>
@@ -4001,7 +4013,7 @@
           <a:p>
             <a:fld id="{D871C1FE-9025-5C49-BA5C-C24D6151D8FF}" type="datetime1">
               <a:rPr lang="en-US" smtClean="0"/>
-              <a:t>5/5/19</a:t>
+              <a:t>7/1/19</a:t>
             </a:fld>
             <a:endParaRPr lang="en-GB"/>
           </a:p>
@@ -4228,7 +4240,7 @@
           <a:p>
             <a:fld id="{13B1BC43-4B43-954F-8BAE-86993A84B7B7}" type="datetime1">
               <a:rPr lang="en-US" smtClean="0"/>
-              <a:t>5/5/19</a:t>
+              <a:t>7/1/19</a:t>
             </a:fld>
             <a:endParaRPr lang="en-GB" dirty="0"/>
           </a:p>

</xml_diff>

<commit_message>
Fixing issues with new version of the officer package
</commit_message>
<xml_diff>
--- a/ubiquity_template/library/templates/report.pptx
+++ b/ubiquity_template/library/templates/report.pptx
@@ -211,7 +211,7 @@
           <a:p>
             <a:fld id="{1B656253-81D4-504C-9F22-C43A5586B7F8}" type="datetimeFigureOut">
               <a:rPr lang="en-US" smtClean="0"/>
-              <a:t>7/1/19</a:t>
+              <a:t>7/21/19</a:t>
             </a:fld>
             <a:endParaRPr lang="en-US"/>
           </a:p>
@@ -377,7 +377,7 @@
           <a:p>
             <a:fld id="{EEA38B4D-A065-A048-981C-DE16882AB0B1}" type="datetimeFigureOut">
               <a:rPr lang="en-US" smtClean="0"/>
-              <a:t>7/1/19</a:t>
+              <a:t>7/21/19</a:t>
             </a:fld>
             <a:endParaRPr lang="en-US"/>
           </a:p>
@@ -705,6 +705,9 @@
             <a:off x="1371600" y="3886200"/>
             <a:ext cx="6400800" cy="1752600"/>
           </a:xfrm>
+          <a:prstGeom prst="rect">
+            <a:avLst/>
+          </a:prstGeom>
         </p:spPr>
         <p:txBody>
           <a:bodyPr/>
@@ -931,7 +934,7 @@
           <a:p>
             <a:fld id="{52BA1850-337E-7747-91FB-64B4051995E4}" type="datetime1">
               <a:rPr lang="en-US" smtClean="0"/>
-              <a:t>7/1/19</a:t>
+              <a:t>7/21/19</a:t>
             </a:fld>
             <a:endParaRPr lang="en-GB"/>
           </a:p>
@@ -1007,6 +1010,348 @@
 </file>
 
 <file path=ppt/slideLayouts/slideLayout2.xml><?xml version="1.0" encoding="utf-8"?>
+<p:sldLayout xmlns:a="http://schemas.openxmlformats.org/drawingml/2006/main" xmlns:r="http://schemas.openxmlformats.org/officeDocument/2006/relationships" xmlns:p="http://schemas.openxmlformats.org/presentationml/2006/main" preserve="1" userDrawn="1">
+  <p:cSld name="content_text">
+    <p:spTree>
+      <p:nvGrpSpPr>
+        <p:cNvPr id="1" name=""/>
+        <p:cNvGrpSpPr/>
+        <p:nvPr/>
+      </p:nvGrpSpPr>
+      <p:grpSpPr>
+        <a:xfrm>
+          <a:off x="0" y="0"/>
+          <a:ext cx="0" cy="0"/>
+          <a:chOff x="0" y="0"/>
+          <a:chExt cx="0" cy="0"/>
+        </a:xfrm>
+      </p:grpSpPr>
+      <p:pic>
+        <p:nvPicPr>
+          <p:cNvPr id="9" name="Picture 8" descr="slide_background_tall.png"/>
+          <p:cNvPicPr>
+            <a:picLocks noChangeAspect="1"/>
+          </p:cNvPicPr>
+          <p:nvPr userDrawn="1"/>
+        </p:nvPicPr>
+        <p:blipFill>
+          <a:blip r:embed="rId2">
+            <a:extLst>
+              <a:ext uri="{28A0092B-C50C-407E-A947-70E740481C1C}">
+                <a14:useLocalDpi xmlns:a14="http://schemas.microsoft.com/office/drawing/2010/main" val="0"/>
+              </a:ext>
+            </a:extLst>
+          </a:blip>
+          <a:stretch>
+            <a:fillRect/>
+          </a:stretch>
+        </p:blipFill>
+        <p:spPr>
+          <a:xfrm>
+            <a:off x="0" y="-27384"/>
+            <a:ext cx="9144000" cy="1493881"/>
+          </a:xfrm>
+          <a:prstGeom prst="rect">
+            <a:avLst/>
+          </a:prstGeom>
+        </p:spPr>
+      </p:pic>
+      <p:sp>
+        <p:nvSpPr>
+          <p:cNvPr id="2" name="Title 1"/>
+          <p:cNvSpPr>
+            <a:spLocks noGrp="1"/>
+          </p:cNvSpPr>
+          <p:nvPr>
+            <p:ph type="title"/>
+          </p:nvPr>
+        </p:nvSpPr>
+        <p:spPr>
+          <a:xfrm>
+            <a:off x="251520" y="548680"/>
+            <a:ext cx="8640960" cy="706090"/>
+          </a:xfrm>
+        </p:spPr>
+        <p:txBody>
+          <a:bodyPr anchor="b"/>
+          <a:lstStyle>
+            <a:lvl1pPr>
+              <a:lnSpc>
+                <a:spcPct val="80000"/>
+              </a:lnSpc>
+              <a:defRPr/>
+            </a:lvl1pPr>
+          </a:lstStyle>
+          <a:p>
+            <a:r>
+              <a:rPr lang="en-US" dirty="0"/>
+              <a:t>Click to edit Master title style</a:t>
+            </a:r>
+            <a:endParaRPr lang="en-GB" dirty="0"/>
+          </a:p>
+        </p:txBody>
+      </p:sp>
+      <p:sp>
+        <p:nvSpPr>
+          <p:cNvPr id="3" name="Content Placeholder 2"/>
+          <p:cNvSpPr>
+            <a:spLocks noGrp="1"/>
+          </p:cNvSpPr>
+          <p:nvPr>
+            <p:ph idx="1"/>
+          </p:nvPr>
+        </p:nvSpPr>
+        <p:spPr>
+          <a:xfrm>
+            <a:off x="251520" y="1600200"/>
+            <a:ext cx="8686800" cy="4572000"/>
+          </a:xfrm>
+          <a:prstGeom prst="rect">
+            <a:avLst/>
+          </a:prstGeom>
+        </p:spPr>
+        <p:txBody>
+          <a:bodyPr/>
+          <a:lstStyle>
+            <a:lvl1pPr marL="0" indent="0">
+              <a:buNone/>
+              <a:defRPr/>
+            </a:lvl1pPr>
+            <a:lvl2pPr marL="457200" indent="0">
+              <a:buNone/>
+              <a:defRPr/>
+            </a:lvl2pPr>
+            <a:lvl3pPr marL="914400" indent="0">
+              <a:buNone/>
+              <a:defRPr/>
+            </a:lvl3pPr>
+            <a:lvl4pPr marL="1371600" indent="0">
+              <a:buNone/>
+              <a:defRPr/>
+            </a:lvl4pPr>
+            <a:lvl5pPr marL="1828800" indent="0">
+              <a:buNone/>
+              <a:defRPr/>
+            </a:lvl5pPr>
+          </a:lstStyle>
+          <a:p>
+            <a:pPr lvl="0"/>
+            <a:r>
+              <a:rPr lang="en-US" dirty="0"/>
+              <a:t>Click to edit Master text styles</a:t>
+            </a:r>
+          </a:p>
+          <a:p>
+            <a:pPr lvl="1"/>
+            <a:r>
+              <a:rPr lang="en-US" dirty="0"/>
+              <a:t>Second level</a:t>
+            </a:r>
+          </a:p>
+          <a:p>
+            <a:pPr lvl="2"/>
+            <a:r>
+              <a:rPr lang="en-US" dirty="0"/>
+              <a:t>Third level</a:t>
+            </a:r>
+          </a:p>
+          <a:p>
+            <a:pPr lvl="3"/>
+            <a:r>
+              <a:rPr lang="en-US" dirty="0"/>
+              <a:t>Fourth level</a:t>
+            </a:r>
+          </a:p>
+          <a:p>
+            <a:pPr lvl="4"/>
+            <a:r>
+              <a:rPr lang="en-US" dirty="0"/>
+              <a:t>Fifth level</a:t>
+            </a:r>
+            <a:endParaRPr lang="en-GB" dirty="0"/>
+          </a:p>
+        </p:txBody>
+      </p:sp>
+      <p:sp>
+        <p:nvSpPr>
+          <p:cNvPr id="4" name="Date Placeholder 3"/>
+          <p:cNvSpPr>
+            <a:spLocks noGrp="1"/>
+          </p:cNvSpPr>
+          <p:nvPr>
+            <p:ph type="dt" sz="half" idx="10"/>
+          </p:nvPr>
+        </p:nvSpPr>
+        <p:spPr>
+          <a:xfrm>
+            <a:off x="251520" y="6356350"/>
+            <a:ext cx="720080" cy="365125"/>
+          </a:xfrm>
+        </p:spPr>
+        <p:txBody>
+          <a:bodyPr/>
+          <a:lstStyle/>
+          <a:p>
+            <a:fld id="{AA0DAA0C-97E8-DA4A-9975-EC4E464C2F40}" type="datetime1">
+              <a:rPr lang="en-US" smtClean="0"/>
+              <a:t>7/21/19</a:t>
+            </a:fld>
+            <a:endParaRPr lang="en-GB"/>
+          </a:p>
+        </p:txBody>
+      </p:sp>
+      <p:sp>
+        <p:nvSpPr>
+          <p:cNvPr id="5" name="Footer Placeholder 4"/>
+          <p:cNvSpPr>
+            <a:spLocks noGrp="1"/>
+          </p:cNvSpPr>
+          <p:nvPr>
+            <p:ph type="ftr" sz="quarter" idx="11"/>
+          </p:nvPr>
+        </p:nvSpPr>
+        <p:spPr>
+          <a:xfrm>
+            <a:off x="1043608" y="6356350"/>
+            <a:ext cx="7056784" cy="365125"/>
+          </a:xfrm>
+        </p:spPr>
+        <p:txBody>
+          <a:bodyPr/>
+          <a:lstStyle>
+            <a:lvl1pPr algn="l">
+              <a:defRPr/>
+            </a:lvl1pPr>
+          </a:lstStyle>
+          <a:p>
+            <a:endParaRPr lang="en-GB" dirty="0"/>
+          </a:p>
+        </p:txBody>
+      </p:sp>
+      <p:sp>
+        <p:nvSpPr>
+          <p:cNvPr id="6" name="Slide Number Placeholder 5"/>
+          <p:cNvSpPr>
+            <a:spLocks noGrp="1"/>
+          </p:cNvSpPr>
+          <p:nvPr>
+            <p:ph type="sldNum" sz="quarter" idx="12"/>
+          </p:nvPr>
+        </p:nvSpPr>
+        <p:spPr>
+          <a:xfrm>
+            <a:off x="8172400" y="6356350"/>
+            <a:ext cx="720080" cy="365125"/>
+          </a:xfrm>
+        </p:spPr>
+        <p:txBody>
+          <a:bodyPr/>
+          <a:lstStyle/>
+          <a:p>
+            <a:fld id="{8DADB20D-508E-4C6D-A9E4-257D5607B0F6}" type="slidenum">
+              <a:rPr lang="en-GB" smtClean="0"/>
+              <a:t>‹#›</a:t>
+            </a:fld>
+            <a:endParaRPr lang="en-GB"/>
+          </a:p>
+        </p:txBody>
+      </p:sp>
+      <p:sp>
+        <p:nvSpPr>
+          <p:cNvPr id="10" name="Content Placeholder 10"/>
+          <p:cNvSpPr>
+            <a:spLocks noGrp="1"/>
+          </p:cNvSpPr>
+          <p:nvPr>
+            <p:ph sz="quarter" idx="13"/>
+          </p:nvPr>
+        </p:nvSpPr>
+        <p:spPr>
+          <a:xfrm>
+            <a:off x="251520" y="1038746"/>
+            <a:ext cx="8640959" cy="360362"/>
+          </a:xfrm>
+          <a:prstGeom prst="rect">
+            <a:avLst/>
+          </a:prstGeom>
+        </p:spPr>
+        <p:txBody>
+          <a:bodyPr anchor="t">
+            <a:noAutofit/>
+          </a:bodyPr>
+          <a:lstStyle>
+            <a:lvl1pPr marL="0" indent="0">
+              <a:buNone/>
+              <a:defRPr sz="2400"/>
+            </a:lvl1pPr>
+            <a:lvl2pPr marL="457200" indent="0">
+              <a:buNone/>
+              <a:defRPr sz="2000"/>
+            </a:lvl2pPr>
+            <a:lvl3pPr marL="914400" indent="0">
+              <a:buNone/>
+              <a:defRPr sz="1800"/>
+            </a:lvl3pPr>
+            <a:lvl4pPr marL="1371600" indent="0">
+              <a:buNone/>
+              <a:defRPr sz="1600"/>
+            </a:lvl4pPr>
+            <a:lvl5pPr marL="1828800" indent="0">
+              <a:buNone/>
+              <a:defRPr sz="1600"/>
+            </a:lvl5pPr>
+          </a:lstStyle>
+          <a:p>
+            <a:pPr lvl="0"/>
+            <a:r>
+              <a:rPr lang="en-US" dirty="0"/>
+              <a:t>Click to edit Master text styles</a:t>
+            </a:r>
+          </a:p>
+          <a:p>
+            <a:pPr lvl="1"/>
+            <a:r>
+              <a:rPr lang="en-US" dirty="0"/>
+              <a:t>Second level</a:t>
+            </a:r>
+          </a:p>
+          <a:p>
+            <a:pPr lvl="2"/>
+            <a:r>
+              <a:rPr lang="en-US" dirty="0"/>
+              <a:t>Third level</a:t>
+            </a:r>
+          </a:p>
+          <a:p>
+            <a:pPr lvl="3"/>
+            <a:r>
+              <a:rPr lang="en-US" dirty="0"/>
+              <a:t>Fourth level</a:t>
+            </a:r>
+          </a:p>
+          <a:p>
+            <a:pPr lvl="4"/>
+            <a:r>
+              <a:rPr lang="en-US" dirty="0"/>
+              <a:t>Fifth level</a:t>
+            </a:r>
+          </a:p>
+        </p:txBody>
+      </p:sp>
+    </p:spTree>
+    <p:extLst>
+      <p:ext uri="{BB962C8B-B14F-4D97-AF65-F5344CB8AC3E}">
+        <p14:creationId xmlns:p14="http://schemas.microsoft.com/office/powerpoint/2010/main" val="41586755"/>
+      </p:ext>
+    </p:extLst>
+  </p:cSld>
+  <p:clrMapOvr>
+    <a:masterClrMapping/>
+  </p:clrMapOvr>
+</p:sldLayout>
+</file>
+
+<file path=ppt/slideLayouts/slideLayout3.xml><?xml version="1.0" encoding="utf-8"?>
 <p:sldLayout xmlns:a="http://schemas.openxmlformats.org/drawingml/2006/main" xmlns:r="http://schemas.openxmlformats.org/officeDocument/2006/relationships" xmlns:p="http://schemas.openxmlformats.org/presentationml/2006/main" preserve="1" userDrawn="1">
   <p:cSld name="content_list">
     <p:spTree>
@@ -1070,321 +1415,6 @@
           </a:xfrm>
         </p:spPr>
         <p:txBody>
-          <a:bodyPr/>
-          <a:lstStyle>
-            <a:lvl1pPr>
-              <a:lnSpc>
-                <a:spcPct val="80000"/>
-              </a:lnSpc>
-              <a:defRPr/>
-            </a:lvl1pPr>
-          </a:lstStyle>
-          <a:p>
-            <a:r>
-              <a:rPr lang="en-US" dirty="0"/>
-              <a:t>Click to edit Master title style</a:t>
-            </a:r>
-            <a:endParaRPr lang="en-GB" dirty="0"/>
-          </a:p>
-        </p:txBody>
-      </p:sp>
-      <p:sp>
-        <p:nvSpPr>
-          <p:cNvPr id="3" name="Content Placeholder 2"/>
-          <p:cNvSpPr>
-            <a:spLocks noGrp="1"/>
-          </p:cNvSpPr>
-          <p:nvPr>
-            <p:ph idx="1"/>
-          </p:nvPr>
-        </p:nvSpPr>
-        <p:spPr>
-          <a:xfrm>
-            <a:off x="251520" y="1600200"/>
-            <a:ext cx="8686800" cy="4572000"/>
-          </a:xfrm>
-        </p:spPr>
-        <p:txBody>
-          <a:bodyPr/>
-          <a:lstStyle/>
-          <a:p>
-            <a:pPr lvl="0"/>
-            <a:r>
-              <a:rPr lang="en-US" dirty="0"/>
-              <a:t>Click to edit Master text styles</a:t>
-            </a:r>
-          </a:p>
-          <a:p>
-            <a:pPr lvl="1"/>
-            <a:r>
-              <a:rPr lang="en-US" dirty="0"/>
-              <a:t>Second level</a:t>
-            </a:r>
-          </a:p>
-          <a:p>
-            <a:pPr lvl="2"/>
-            <a:r>
-              <a:rPr lang="en-US" dirty="0"/>
-              <a:t>Third level</a:t>
-            </a:r>
-          </a:p>
-          <a:p>
-            <a:pPr lvl="3"/>
-            <a:r>
-              <a:rPr lang="en-US" dirty="0"/>
-              <a:t>Fourth level</a:t>
-            </a:r>
-          </a:p>
-          <a:p>
-            <a:pPr lvl="4"/>
-            <a:r>
-              <a:rPr lang="en-US" dirty="0"/>
-              <a:t>Fifth level</a:t>
-            </a:r>
-            <a:endParaRPr lang="en-GB" dirty="0"/>
-          </a:p>
-        </p:txBody>
-      </p:sp>
-      <p:sp>
-        <p:nvSpPr>
-          <p:cNvPr id="4" name="Date Placeholder 3"/>
-          <p:cNvSpPr>
-            <a:spLocks noGrp="1"/>
-          </p:cNvSpPr>
-          <p:nvPr>
-            <p:ph type="dt" sz="half" idx="10"/>
-          </p:nvPr>
-        </p:nvSpPr>
-        <p:spPr>
-          <a:xfrm>
-            <a:off x="251520" y="6356350"/>
-            <a:ext cx="720080" cy="365125"/>
-          </a:xfrm>
-        </p:spPr>
-        <p:txBody>
-          <a:bodyPr/>
-          <a:lstStyle/>
-          <a:p>
-            <a:fld id="{BB662456-9DF9-7F42-9863-03F75BEC0447}" type="datetime1">
-              <a:rPr lang="en-US" smtClean="0"/>
-              <a:t>7/1/19</a:t>
-            </a:fld>
-            <a:endParaRPr lang="en-GB"/>
-          </a:p>
-        </p:txBody>
-      </p:sp>
-      <p:sp>
-        <p:nvSpPr>
-          <p:cNvPr id="5" name="Footer Placeholder 4"/>
-          <p:cNvSpPr>
-            <a:spLocks noGrp="1"/>
-          </p:cNvSpPr>
-          <p:nvPr>
-            <p:ph type="ftr" sz="quarter" idx="11"/>
-          </p:nvPr>
-        </p:nvSpPr>
-        <p:spPr>
-          <a:xfrm>
-            <a:off x="1043608" y="6356350"/>
-            <a:ext cx="7056784" cy="365125"/>
-          </a:xfrm>
-        </p:spPr>
-        <p:txBody>
-          <a:bodyPr/>
-          <a:lstStyle>
-            <a:lvl1pPr algn="l">
-              <a:defRPr/>
-            </a:lvl1pPr>
-          </a:lstStyle>
-          <a:p>
-            <a:endParaRPr lang="en-GB" dirty="0"/>
-          </a:p>
-        </p:txBody>
-      </p:sp>
-      <p:sp>
-        <p:nvSpPr>
-          <p:cNvPr id="6" name="Slide Number Placeholder 5"/>
-          <p:cNvSpPr>
-            <a:spLocks noGrp="1"/>
-          </p:cNvSpPr>
-          <p:nvPr>
-            <p:ph type="sldNum" sz="quarter" idx="12"/>
-          </p:nvPr>
-        </p:nvSpPr>
-        <p:spPr>
-          <a:xfrm>
-            <a:off x="8172400" y="6356350"/>
-            <a:ext cx="720080" cy="365125"/>
-          </a:xfrm>
-        </p:spPr>
-        <p:txBody>
-          <a:bodyPr/>
-          <a:lstStyle/>
-          <a:p>
-            <a:fld id="{8DADB20D-508E-4C6D-A9E4-257D5607B0F6}" type="slidenum">
-              <a:rPr lang="en-GB" smtClean="0"/>
-              <a:t>‹#›</a:t>
-            </a:fld>
-            <a:endParaRPr lang="en-GB"/>
-          </a:p>
-        </p:txBody>
-      </p:sp>
-      <p:sp>
-        <p:nvSpPr>
-          <p:cNvPr id="10" name="Content Placeholder 10"/>
-          <p:cNvSpPr>
-            <a:spLocks noGrp="1"/>
-          </p:cNvSpPr>
-          <p:nvPr>
-            <p:ph sz="quarter" idx="13"/>
-          </p:nvPr>
-        </p:nvSpPr>
-        <p:spPr>
-          <a:xfrm>
-            <a:off x="251520" y="1038746"/>
-            <a:ext cx="8640959" cy="360362"/>
-          </a:xfrm>
-        </p:spPr>
-        <p:txBody>
-          <a:bodyPr>
-            <a:noAutofit/>
-          </a:bodyPr>
-          <a:lstStyle>
-            <a:lvl1pPr marL="0" indent="0">
-              <a:buNone/>
-              <a:defRPr sz="2400"/>
-            </a:lvl1pPr>
-            <a:lvl2pPr marL="457200" indent="0">
-              <a:buNone/>
-              <a:defRPr sz="2000"/>
-            </a:lvl2pPr>
-            <a:lvl3pPr marL="914400" indent="0">
-              <a:buNone/>
-              <a:defRPr sz="1800"/>
-            </a:lvl3pPr>
-            <a:lvl4pPr marL="1371600" indent="0">
-              <a:buNone/>
-              <a:defRPr sz="1600"/>
-            </a:lvl4pPr>
-            <a:lvl5pPr marL="1828800" indent="0">
-              <a:buNone/>
-              <a:defRPr sz="1600"/>
-            </a:lvl5pPr>
-          </a:lstStyle>
-          <a:p>
-            <a:pPr lvl="0"/>
-            <a:r>
-              <a:rPr lang="en-US" dirty="0"/>
-              <a:t>Click to edit Master text styles</a:t>
-            </a:r>
-          </a:p>
-          <a:p>
-            <a:pPr lvl="1"/>
-            <a:r>
-              <a:rPr lang="en-US" dirty="0"/>
-              <a:t>Second level</a:t>
-            </a:r>
-          </a:p>
-          <a:p>
-            <a:pPr lvl="2"/>
-            <a:r>
-              <a:rPr lang="en-US" dirty="0"/>
-              <a:t>Third level</a:t>
-            </a:r>
-          </a:p>
-          <a:p>
-            <a:pPr lvl="3"/>
-            <a:r>
-              <a:rPr lang="en-US" dirty="0"/>
-              <a:t>Fourth level</a:t>
-            </a:r>
-          </a:p>
-          <a:p>
-            <a:pPr lvl="4"/>
-            <a:r>
-              <a:rPr lang="en-US" dirty="0"/>
-              <a:t>Fifth level</a:t>
-            </a:r>
-          </a:p>
-        </p:txBody>
-      </p:sp>
-    </p:spTree>
-    <p:extLst>
-      <p:ext uri="{BB962C8B-B14F-4D97-AF65-F5344CB8AC3E}">
-        <p14:creationId xmlns:p14="http://schemas.microsoft.com/office/powerpoint/2010/main" val="271576982"/>
-      </p:ext>
-    </p:extLst>
-  </p:cSld>
-  <p:clrMapOvr>
-    <a:masterClrMapping/>
-  </p:clrMapOvr>
-</p:sldLayout>
-</file>
-
-<file path=ppt/slideLayouts/slideLayout3.xml><?xml version="1.0" encoding="utf-8"?>
-<p:sldLayout xmlns:a="http://schemas.openxmlformats.org/drawingml/2006/main" xmlns:r="http://schemas.openxmlformats.org/officeDocument/2006/relationships" xmlns:p="http://schemas.openxmlformats.org/presentationml/2006/main" preserve="1" userDrawn="1">
-  <p:cSld name="content_text">
-    <p:spTree>
-      <p:nvGrpSpPr>
-        <p:cNvPr id="1" name=""/>
-        <p:cNvGrpSpPr/>
-        <p:nvPr/>
-      </p:nvGrpSpPr>
-      <p:grpSpPr>
-        <a:xfrm>
-          <a:off x="0" y="0"/>
-          <a:ext cx="0" cy="0"/>
-          <a:chOff x="0" y="0"/>
-          <a:chExt cx="0" cy="0"/>
-        </a:xfrm>
-      </p:grpSpPr>
-      <p:pic>
-        <p:nvPicPr>
-          <p:cNvPr id="9" name="Picture 8" descr="slide_background_tall.png"/>
-          <p:cNvPicPr>
-            <a:picLocks noChangeAspect="1"/>
-          </p:cNvPicPr>
-          <p:nvPr userDrawn="1"/>
-        </p:nvPicPr>
-        <p:blipFill>
-          <a:blip r:embed="rId2">
-            <a:extLst>
-              <a:ext uri="{28A0092B-C50C-407E-A947-70E740481C1C}">
-                <a14:useLocalDpi xmlns:a14="http://schemas.microsoft.com/office/drawing/2010/main" val="0"/>
-              </a:ext>
-            </a:extLst>
-          </a:blip>
-          <a:stretch>
-            <a:fillRect/>
-          </a:stretch>
-        </p:blipFill>
-        <p:spPr>
-          <a:xfrm>
-            <a:off x="0" y="-27384"/>
-            <a:ext cx="9144000" cy="1493881"/>
-          </a:xfrm>
-          <a:prstGeom prst="rect">
-            <a:avLst/>
-          </a:prstGeom>
-        </p:spPr>
-      </p:pic>
-      <p:sp>
-        <p:nvSpPr>
-          <p:cNvPr id="2" name="Title 1"/>
-          <p:cNvSpPr>
-            <a:spLocks noGrp="1"/>
-          </p:cNvSpPr>
-          <p:nvPr>
-            <p:ph type="title"/>
-          </p:nvPr>
-        </p:nvSpPr>
-        <p:spPr>
-          <a:xfrm>
-            <a:off x="251520" y="548680"/>
-            <a:ext cx="8640960" cy="706090"/>
-          </a:xfrm>
-        </p:spPr>
-        <p:txBody>
           <a:bodyPr anchor="b"/>
           <a:lstStyle>
             <a:lvl1pPr>
@@ -1418,28 +1448,36 @@
             <a:off x="251520" y="1600200"/>
             <a:ext cx="8686800" cy="4572000"/>
           </a:xfrm>
+          <a:prstGeom prst="rect">
+            <a:avLst/>
+          </a:prstGeom>
         </p:spPr>
         <p:txBody>
           <a:bodyPr/>
           <a:lstStyle>
-            <a:lvl1pPr marL="0" indent="0">
-              <a:buNone/>
+            <a:lvl1pPr marL="457200" indent="-457200">
+              <a:buFont typeface="Arial" panose="020B0604020202020204" pitchFamily="34" charset="0"/>
+              <a:buChar char="•"/>
               <a:defRPr/>
             </a:lvl1pPr>
-            <a:lvl2pPr marL="457200" indent="0">
-              <a:buNone/>
+            <a:lvl2pPr marL="914400" indent="-457200">
+              <a:buFont typeface="Arial" panose="020B0604020202020204" pitchFamily="34" charset="0"/>
+              <a:buChar char="•"/>
               <a:defRPr/>
             </a:lvl2pPr>
-            <a:lvl3pPr marL="914400" indent="0">
-              <a:buNone/>
+            <a:lvl3pPr marL="1257300" indent="-342900">
+              <a:buFont typeface="Arial" panose="020B0604020202020204" pitchFamily="34" charset="0"/>
+              <a:buChar char="•"/>
               <a:defRPr/>
             </a:lvl3pPr>
-            <a:lvl4pPr marL="1371600" indent="0">
-              <a:buNone/>
+            <a:lvl4pPr marL="1714500" indent="-342900">
+              <a:buFont typeface="Arial" panose="020B0604020202020204" pitchFamily="34" charset="0"/>
+              <a:buChar char="•"/>
               <a:defRPr/>
             </a:lvl4pPr>
-            <a:lvl5pPr marL="1828800" indent="0">
-              <a:buNone/>
+            <a:lvl5pPr marL="2171700" indent="-342900">
+              <a:buFont typeface="Arial" panose="020B0604020202020204" pitchFamily="34" charset="0"/>
+              <a:buChar char="•"/>
               <a:defRPr/>
             </a:lvl5pPr>
           </a:lstStyle>
@@ -1503,7 +1541,7 @@
           <a:p>
             <a:fld id="{AA0DAA0C-97E8-DA4A-9975-EC4E464C2F40}" type="datetime1">
               <a:rPr lang="en-US" smtClean="0"/>
-              <a:t>7/1/19</a:t>
+              <a:t>7/21/19</a:t>
             </a:fld>
             <a:endParaRPr lang="en-GB"/>
           </a:p>
@@ -1580,6 +1618,9 @@
             <a:off x="251520" y="1038746"/>
             <a:ext cx="8640959" cy="360362"/>
           </a:xfrm>
+          <a:prstGeom prst="rect">
+            <a:avLst/>
+          </a:prstGeom>
         </p:spPr>
         <p:txBody>
           <a:bodyPr anchor="t">
@@ -1647,7 +1688,7 @@
     </p:spTree>
     <p:extLst>
       <p:ext uri="{BB962C8B-B14F-4D97-AF65-F5344CB8AC3E}">
-        <p14:creationId xmlns:p14="http://schemas.microsoft.com/office/powerpoint/2010/main" val="41586755"/>
+        <p14:creationId xmlns:p14="http://schemas.microsoft.com/office/powerpoint/2010/main" val="2947031213"/>
       </p:ext>
     </p:extLst>
   </p:cSld>
@@ -1721,6 +1762,9 @@
             <a:off x="685800" y="1254125"/>
             <a:ext cx="7772400" cy="1752600"/>
           </a:xfrm>
+          <a:prstGeom prst="rect">
+            <a:avLst/>
+          </a:prstGeom>
         </p:spPr>
         <p:txBody>
           <a:bodyPr anchor="b">
@@ -2007,6 +2051,9 @@
             <a:off x="251520" y="2204864"/>
             <a:ext cx="4244280" cy="4032448"/>
           </a:xfrm>
+          <a:prstGeom prst="rect">
+            <a:avLst/>
+          </a:prstGeom>
         </p:spPr>
         <p:txBody>
           <a:bodyPr/>
@@ -2092,6 +2139,9 @@
             <a:off x="4648200" y="2204864"/>
             <a:ext cx="4244280" cy="4032448"/>
           </a:xfrm>
+          <a:prstGeom prst="rect">
+            <a:avLst/>
+          </a:prstGeom>
         </p:spPr>
         <p:txBody>
           <a:bodyPr/>
@@ -2184,7 +2234,7 @@
           <a:p>
             <a:fld id="{04A76F9C-33B6-4248-95F4-E755A51BE64F}" type="datetime1">
               <a:rPr lang="en-US" smtClean="0"/>
-              <a:t>7/1/19</a:t>
+              <a:t>7/21/19</a:t>
             </a:fld>
             <a:endParaRPr lang="en-GB"/>
           </a:p>
@@ -2261,6 +2311,9 @@
             <a:off x="251521" y="1038424"/>
             <a:ext cx="8640960" cy="360362"/>
           </a:xfrm>
+          <a:prstGeom prst="rect">
+            <a:avLst/>
+          </a:prstGeom>
         </p:spPr>
         <p:txBody>
           <a:bodyPr>
@@ -2340,6 +2393,9 @@
             <a:off x="251520" y="1535113"/>
             <a:ext cx="4245868" cy="639762"/>
           </a:xfrm>
+          <a:prstGeom prst="rect">
+            <a:avLst/>
+          </a:prstGeom>
         </p:spPr>
         <p:txBody>
           <a:bodyPr anchor="b"/>
@@ -2405,6 +2461,9 @@
             <a:off x="4645025" y="1535113"/>
             <a:ext cx="4247455" cy="639762"/>
           </a:xfrm>
+          <a:prstGeom prst="rect">
+            <a:avLst/>
+          </a:prstGeom>
         </p:spPr>
         <p:txBody>
           <a:bodyPr anchor="b"/>
@@ -2565,6 +2624,9 @@
             <a:off x="251520" y="2204864"/>
             <a:ext cx="4244280" cy="4032448"/>
           </a:xfrm>
+          <a:prstGeom prst="rect">
+            <a:avLst/>
+          </a:prstGeom>
         </p:spPr>
         <p:txBody>
           <a:bodyPr>
@@ -2657,6 +2719,9 @@
             <a:off x="4648200" y="2204864"/>
             <a:ext cx="4244280" cy="4032448"/>
           </a:xfrm>
+          <a:prstGeom prst="rect">
+            <a:avLst/>
+          </a:prstGeom>
         </p:spPr>
         <p:txBody>
           <a:bodyPr>
@@ -2756,7 +2821,7 @@
           <a:p>
             <a:fld id="{7BA53915-059E-FD4B-A198-BD5AD9F97206}" type="datetime1">
               <a:rPr lang="en-US" smtClean="0"/>
-              <a:t>7/1/19</a:t>
+              <a:t>7/21/19</a:t>
             </a:fld>
             <a:endParaRPr lang="en-GB"/>
           </a:p>
@@ -2833,6 +2898,9 @@
             <a:off x="251521" y="1038424"/>
             <a:ext cx="8640960" cy="360362"/>
           </a:xfrm>
+          <a:prstGeom prst="rect">
+            <a:avLst/>
+          </a:prstGeom>
         </p:spPr>
         <p:txBody>
           <a:bodyPr>
@@ -2912,6 +2980,9 @@
             <a:off x="251520" y="1535113"/>
             <a:ext cx="4245868" cy="639762"/>
           </a:xfrm>
+          <a:prstGeom prst="rect">
+            <a:avLst/>
+          </a:prstGeom>
         </p:spPr>
         <p:txBody>
           <a:bodyPr anchor="b"/>
@@ -2977,6 +3048,9 @@
             <a:off x="4645025" y="1535113"/>
             <a:ext cx="4247455" cy="639762"/>
           </a:xfrm>
+          <a:prstGeom prst="rect">
+            <a:avLst/>
+          </a:prstGeom>
         </p:spPr>
         <p:txBody>
           <a:bodyPr anchor="b"/>
@@ -3137,6 +3211,9 @@
             <a:off x="251520" y="1600200"/>
             <a:ext cx="4261104" cy="4572000"/>
           </a:xfrm>
+          <a:prstGeom prst="rect">
+            <a:avLst/>
+          </a:prstGeom>
         </p:spPr>
         <p:txBody>
           <a:bodyPr>
@@ -3224,6 +3301,9 @@
             <a:off x="4648200" y="1600200"/>
             <a:ext cx="4251960" cy="4572000"/>
           </a:xfrm>
+          <a:prstGeom prst="rect">
+            <a:avLst/>
+          </a:prstGeom>
         </p:spPr>
         <p:txBody>
           <a:bodyPr>
@@ -3318,7 +3398,7 @@
           <a:p>
             <a:fld id="{F7C6CE28-510F-5240-BB2D-5CAA84033ED0}" type="datetime1">
               <a:rPr lang="en-US" smtClean="0"/>
-              <a:t>7/1/19</a:t>
+              <a:t>7/21/19</a:t>
             </a:fld>
             <a:endParaRPr lang="en-GB"/>
           </a:p>
@@ -3395,6 +3475,9 @@
             <a:off x="251520" y="1038424"/>
             <a:ext cx="8640959" cy="360362"/>
           </a:xfrm>
+          <a:prstGeom prst="rect">
+            <a:avLst/>
+          </a:prstGeom>
         </p:spPr>
         <p:txBody>
           <a:bodyPr>
@@ -3569,6 +3652,9 @@
             <a:off x="251520" y="1600200"/>
             <a:ext cx="4244280" cy="4637112"/>
           </a:xfrm>
+          <a:prstGeom prst="rect">
+            <a:avLst/>
+          </a:prstGeom>
         </p:spPr>
         <p:txBody>
           <a:bodyPr>
@@ -3661,6 +3747,9 @@
             <a:off x="4648200" y="1600200"/>
             <a:ext cx="4244280" cy="4637112"/>
           </a:xfrm>
+          <a:prstGeom prst="rect">
+            <a:avLst/>
+          </a:prstGeom>
         </p:spPr>
         <p:txBody>
           <a:bodyPr>
@@ -3760,7 +3849,7 @@
           <a:p>
             <a:fld id="{DC8473B6-9DB1-6841-865B-A1275004FC4D}" type="datetime1">
               <a:rPr lang="en-US" smtClean="0"/>
-              <a:t>7/1/19</a:t>
+              <a:t>7/21/19</a:t>
             </a:fld>
             <a:endParaRPr lang="en-GB"/>
           </a:p>
@@ -3837,6 +3926,9 @@
             <a:off x="251520" y="1038424"/>
             <a:ext cx="8640959" cy="360362"/>
           </a:xfrm>
+          <a:prstGeom prst="rect">
+            <a:avLst/>
+          </a:prstGeom>
         </p:spPr>
         <p:txBody>
           <a:bodyPr>
@@ -4013,7 +4105,7 @@
           <a:p>
             <a:fld id="{D871C1FE-9025-5C49-BA5C-C24D6151D8FF}" type="datetime1">
               <a:rPr lang="en-US" smtClean="0"/>
-              <a:t>7/1/19</a:t>
+              <a:t>7/21/19</a:t>
             </a:fld>
             <a:endParaRPr lang="en-GB"/>
           </a:p>
@@ -4240,7 +4332,7 @@
           <a:p>
             <a:fld id="{13B1BC43-4B43-954F-8BAE-86993A84B7B7}" type="datetime1">
               <a:rPr lang="en-US" smtClean="0"/>
-              <a:t>7/1/19</a:t>
+              <a:t>7/21/19</a:t>
             </a:fld>
             <a:endParaRPr lang="en-GB" dirty="0"/>
           </a:p>
@@ -4334,8 +4426,8 @@
   <p:clrMap bg1="lt1" tx1="dk1" bg2="lt2" tx2="dk2" accent1="accent1" accent2="accent2" accent3="accent3" accent4="accent4" accent5="accent5" accent6="accent6" hlink="hlink" folHlink="folHlink"/>
   <p:sldLayoutIdLst>
     <p:sldLayoutId id="2147483649" r:id="rId1"/>
-    <p:sldLayoutId id="2147483650" r:id="rId2"/>
-    <p:sldLayoutId id="2147483656" r:id="rId3"/>
+    <p:sldLayoutId id="2147483656" r:id="rId2"/>
+    <p:sldLayoutId id="2147483661" r:id="rId3"/>
     <p:sldLayoutId id="2147483660" r:id="rId4"/>
     <p:sldLayoutId id="2147483652" r:id="rId5"/>
     <p:sldLayoutId id="2147483658" r:id="rId6"/>

</xml_diff>